<commit_message>
Doku usage of trace admin objects. Reference guard class for class trace admin objects. Transmit ServerSettings between IpcClient and IpcServer.
Dialog GetInstance calls with objectName. CreateInstance calls with DlgTitle followed by objectName.
</commit_message>
<xml_diff>
--- a/Doc/Libs/ZSIpcTrace/Overview.pptx
+++ b/Doc/Libs/ZSIpcTrace/Overview.pptx
@@ -104,6 +104,11 @@
       </a:defRPr>
     </a:lvl9pPr>
   </p:defaultTextStyle>
+  <p:extLst>
+    <p:ext uri="{EFAFB233-063F-42B5-8137-9DF3F51BA10A}">
+      <p15:sldGuideLst xmlns:p15="http://schemas.microsoft.com/office/powerpoint/2012/main"/>
+    </p:ext>
+  </p:extLst>
 </p:presentation>
 </file>
 
@@ -254,7 +259,7 @@
           <a:p>
             <a:fld id="{99BCB60A-E9EF-4256-A8F3-CDC6B78250BE}" type="datetimeFigureOut">
               <a:rPr lang="de-DE" smtClean="0"/>
-              <a:t>27.02.2022</a:t>
+              <a:t>10.03.2022</a:t>
             </a:fld>
             <a:endParaRPr lang="de-DE"/>
           </a:p>
@@ -452,7 +457,7 @@
           <a:p>
             <a:fld id="{99BCB60A-E9EF-4256-A8F3-CDC6B78250BE}" type="datetimeFigureOut">
               <a:rPr lang="de-DE" smtClean="0"/>
-              <a:t>27.02.2022</a:t>
+              <a:t>10.03.2022</a:t>
             </a:fld>
             <a:endParaRPr lang="de-DE"/>
           </a:p>
@@ -660,7 +665,7 @@
           <a:p>
             <a:fld id="{99BCB60A-E9EF-4256-A8F3-CDC6B78250BE}" type="datetimeFigureOut">
               <a:rPr lang="de-DE" smtClean="0"/>
-              <a:t>27.02.2022</a:t>
+              <a:t>10.03.2022</a:t>
             </a:fld>
             <a:endParaRPr lang="de-DE"/>
           </a:p>
@@ -858,7 +863,7 @@
           <a:p>
             <a:fld id="{99BCB60A-E9EF-4256-A8F3-CDC6B78250BE}" type="datetimeFigureOut">
               <a:rPr lang="de-DE" smtClean="0"/>
-              <a:t>27.02.2022</a:t>
+              <a:t>10.03.2022</a:t>
             </a:fld>
             <a:endParaRPr lang="de-DE"/>
           </a:p>
@@ -1133,7 +1138,7 @@
           <a:p>
             <a:fld id="{99BCB60A-E9EF-4256-A8F3-CDC6B78250BE}" type="datetimeFigureOut">
               <a:rPr lang="de-DE" smtClean="0"/>
-              <a:t>27.02.2022</a:t>
+              <a:t>10.03.2022</a:t>
             </a:fld>
             <a:endParaRPr lang="de-DE"/>
           </a:p>
@@ -1398,7 +1403,7 @@
           <a:p>
             <a:fld id="{99BCB60A-E9EF-4256-A8F3-CDC6B78250BE}" type="datetimeFigureOut">
               <a:rPr lang="de-DE" smtClean="0"/>
-              <a:t>27.02.2022</a:t>
+              <a:t>10.03.2022</a:t>
             </a:fld>
             <a:endParaRPr lang="de-DE"/>
           </a:p>
@@ -1810,7 +1815,7 @@
           <a:p>
             <a:fld id="{99BCB60A-E9EF-4256-A8F3-CDC6B78250BE}" type="datetimeFigureOut">
               <a:rPr lang="de-DE" smtClean="0"/>
-              <a:t>27.02.2022</a:t>
+              <a:t>10.03.2022</a:t>
             </a:fld>
             <a:endParaRPr lang="de-DE"/>
           </a:p>
@@ -1951,7 +1956,7 @@
           <a:p>
             <a:fld id="{99BCB60A-E9EF-4256-A8F3-CDC6B78250BE}" type="datetimeFigureOut">
               <a:rPr lang="de-DE" smtClean="0"/>
-              <a:t>27.02.2022</a:t>
+              <a:t>10.03.2022</a:t>
             </a:fld>
             <a:endParaRPr lang="de-DE"/>
           </a:p>
@@ -2064,7 +2069,7 @@
           <a:p>
             <a:fld id="{99BCB60A-E9EF-4256-A8F3-CDC6B78250BE}" type="datetimeFigureOut">
               <a:rPr lang="de-DE" smtClean="0"/>
-              <a:t>27.02.2022</a:t>
+              <a:t>10.03.2022</a:t>
             </a:fld>
             <a:endParaRPr lang="de-DE"/>
           </a:p>
@@ -2375,7 +2380,7 @@
           <a:p>
             <a:fld id="{99BCB60A-E9EF-4256-A8F3-CDC6B78250BE}" type="datetimeFigureOut">
               <a:rPr lang="de-DE" smtClean="0"/>
-              <a:t>27.02.2022</a:t>
+              <a:t>10.03.2022</a:t>
             </a:fld>
             <a:endParaRPr lang="de-DE"/>
           </a:p>
@@ -2663,7 +2668,7 @@
           <a:p>
             <a:fld id="{99BCB60A-E9EF-4256-A8F3-CDC6B78250BE}" type="datetimeFigureOut">
               <a:rPr lang="de-DE" smtClean="0"/>
-              <a:t>27.02.2022</a:t>
+              <a:t>10.03.2022</a:t>
             </a:fld>
             <a:endParaRPr lang="de-DE"/>
           </a:p>
@@ -2904,7 +2909,7 @@
           <a:p>
             <a:fld id="{99BCB60A-E9EF-4256-A8F3-CDC6B78250BE}" type="datetimeFigureOut">
               <a:rPr lang="de-DE" smtClean="0"/>
-              <a:t>27.02.2022</a:t>
+              <a:t>10.03.2022</a:t>
             </a:fld>
             <a:endParaRPr lang="de-DE"/>
           </a:p>
@@ -3387,8 +3392,8 @@
         </p:nvSpPr>
         <p:spPr>
           <a:xfrm>
-            <a:off x="8030101" y="972298"/>
-            <a:ext cx="2642421" cy="4024890"/>
+            <a:off x="7517854" y="1046981"/>
+            <a:ext cx="4080669" cy="4494436"/>
           </a:xfrm>
           <a:prstGeom prst="rect">
             <a:avLst/>
@@ -3980,7 +3985,7 @@
           <a:p>
             <a:r>
               <a:rPr lang="de-DE" sz="1400" dirty="0"/>
-              <a:t>App.log</a:t>
+              <a:t>Trace.log</a:t>
             </a:r>
           </a:p>
         </p:txBody>
@@ -4157,7 +4162,7 @@
         </p:nvSpPr>
         <p:spPr>
           <a:xfrm>
-            <a:off x="8637247" y="3272774"/>
+            <a:off x="8027651" y="3272774"/>
             <a:ext cx="1509261" cy="290052"/>
           </a:xfrm>
           <a:prstGeom prst="rect">
@@ -4235,7 +4240,7 @@
         </p:nvSpPr>
         <p:spPr>
           <a:xfrm>
-            <a:off x="8637246" y="3819606"/>
+            <a:off x="8027650" y="3819606"/>
             <a:ext cx="1509262" cy="290052"/>
           </a:xfrm>
           <a:prstGeom prst="rect">
@@ -4324,7 +4329,7 @@
         </p:nvSpPr>
         <p:spPr>
           <a:xfrm>
-            <a:off x="8437556" y="2620280"/>
+            <a:off x="7827960" y="2620280"/>
             <a:ext cx="1908644" cy="290052"/>
           </a:xfrm>
           <a:prstGeom prst="rect">
@@ -4402,7 +4407,7 @@
         </p:nvSpPr>
         <p:spPr>
           <a:xfrm>
-            <a:off x="8723681" y="1470016"/>
+            <a:off x="8114085" y="1470016"/>
             <a:ext cx="1317516" cy="290052"/>
           </a:xfrm>
           <a:prstGeom prst="rect">
@@ -4480,7 +4485,7 @@
         </p:nvSpPr>
         <p:spPr>
           <a:xfrm>
-            <a:off x="8723682" y="2094796"/>
+            <a:off x="8114086" y="2094796"/>
             <a:ext cx="1317516" cy="290052"/>
           </a:xfrm>
           <a:prstGeom prst="rect">
@@ -4558,8 +4563,8 @@
         </p:nvSpPr>
         <p:spPr>
           <a:xfrm>
-            <a:off x="8644528" y="4454489"/>
-            <a:ext cx="1509261" cy="290050"/>
+            <a:off x="9915825" y="3253586"/>
+            <a:ext cx="1509260" cy="290050"/>
           </a:xfrm>
           <a:prstGeom prst="rect">
             <a:avLst/>
@@ -4937,7 +4942,7 @@
         </p:nvCxnSpPr>
         <p:spPr>
           <a:xfrm flipH="1">
-            <a:off x="9391877" y="3562826"/>
+            <a:off x="8782281" y="3562826"/>
             <a:ext cx="1" cy="256780"/>
           </a:xfrm>
           <a:prstGeom prst="straightConnector1">
@@ -4980,7 +4985,7 @@
         </p:nvCxnSpPr>
         <p:spPr>
           <a:xfrm flipV="1">
-            <a:off x="9391878" y="2910332"/>
+            <a:off x="8782282" y="2910332"/>
             <a:ext cx="0" cy="362442"/>
           </a:xfrm>
           <a:prstGeom prst="straightConnector1">
@@ -5023,7 +5028,7 @@
         </p:nvCxnSpPr>
         <p:spPr>
           <a:xfrm flipH="1" flipV="1">
-            <a:off x="9382440" y="2384848"/>
+            <a:off x="8772844" y="2384848"/>
             <a:ext cx="9438" cy="235432"/>
           </a:xfrm>
           <a:prstGeom prst="straightConnector1">
@@ -5066,7 +5071,7 @@
         </p:nvCxnSpPr>
         <p:spPr>
           <a:xfrm flipH="1" flipV="1">
-            <a:off x="9382439" y="1760068"/>
+            <a:off x="8772843" y="1760068"/>
             <a:ext cx="1" cy="334728"/>
           </a:xfrm>
           <a:prstGeom prst="straightConnector1">
@@ -5139,10 +5144,145 @@
       </p:sp>
       <p:sp>
         <p:nvSpPr>
-          <p:cNvPr id="57" name="Pfeil: nach unten 56">
-            <a:extLst>
-              <a:ext uri="{FF2B5EF4-FFF2-40B4-BE49-F238E27FC236}">
-                <a16:creationId xmlns:a16="http://schemas.microsoft.com/office/drawing/2014/main" id="{CDBD63CA-C1A7-4A23-A6B8-D1A5E8BC4A9A}"/>
+          <p:cNvPr id="68" name="Textfeld 67">
+            <a:extLst>
+              <a:ext uri="{FF2B5EF4-FFF2-40B4-BE49-F238E27FC236}">
+                <a16:creationId xmlns:a16="http://schemas.microsoft.com/office/drawing/2014/main" id="{DC3D8D6D-472A-428B-A3BE-B793130FF065}"/>
+              </a:ext>
+            </a:extLst>
+          </p:cNvPr>
+          <p:cNvSpPr txBox="1"/>
+          <p:nvPr/>
+        </p:nvSpPr>
+        <p:spPr>
+          <a:xfrm rot="5400000">
+            <a:off x="6286582" y="3333918"/>
+            <a:ext cx="1532471" cy="307777"/>
+          </a:xfrm>
+          <a:prstGeom prst="rect">
+            <a:avLst/>
+          </a:prstGeom>
+          <a:noFill/>
+        </p:spPr>
+        <p:txBody>
+          <a:bodyPr wrap="none" rtlCol="0">
+            <a:spAutoFit/>
+          </a:bodyPr>
+          <a:lstStyle/>
+          <a:p>
+            <a:r>
+              <a:rPr lang="de-DE" sz="1400" dirty="0"/>
+              <a:t>TCP/IP Connection</a:t>
+            </a:r>
+          </a:p>
+        </p:txBody>
+      </p:sp>
+      <p:sp>
+        <p:nvSpPr>
+          <p:cNvPr id="34" name="Titel 1">
+            <a:extLst>
+              <a:ext uri="{FF2B5EF4-FFF2-40B4-BE49-F238E27FC236}">
+                <a16:creationId xmlns:a16="http://schemas.microsoft.com/office/drawing/2014/main" id="{E4D9FCAC-A1EA-4474-A661-C761A22B2097}"/>
+              </a:ext>
+            </a:extLst>
+          </p:cNvPr>
+          <p:cNvSpPr txBox="1">
+            <a:spLocks/>
+          </p:cNvSpPr>
+          <p:nvPr/>
+        </p:nvSpPr>
+        <p:spPr>
+          <a:xfrm>
+            <a:off x="3948331" y="2744562"/>
+            <a:ext cx="2430448" cy="290052"/>
+          </a:xfrm>
+          <a:prstGeom prst="rect">
+            <a:avLst/>
+          </a:prstGeom>
+          <a:solidFill>
+            <a:schemeClr val="bg1">
+              <a:lumMod val="85000"/>
+            </a:schemeClr>
+          </a:solidFill>
+          <a:ln>
+            <a:solidFill>
+              <a:schemeClr val="tx1"/>
+            </a:solidFill>
+          </a:ln>
+        </p:spPr>
+        <p:txBody>
+          <a:bodyPr vert="horz" lIns="91440" tIns="45720" rIns="91440" bIns="45720" rtlCol="0" anchor="b">
+            <a:normAutofit/>
+          </a:bodyPr>
+          <a:lstStyle>
+            <a:lvl1pPr algn="ctr" defTabSz="914400" rtl="0" eaLnBrk="1" latinLnBrk="0" hangingPunct="1">
+              <a:lnSpc>
+                <a:spcPct val="90000"/>
+              </a:lnSpc>
+              <a:spcBef>
+                <a:spcPct val="0"/>
+              </a:spcBef>
+              <a:buNone/>
+              <a:defRPr sz="6000" kern="1200">
+                <a:solidFill>
+                  <a:schemeClr val="tx1"/>
+                </a:solidFill>
+                <a:latin typeface="+mj-lt"/>
+                <a:ea typeface="+mj-ea"/>
+                <a:cs typeface="+mj-cs"/>
+              </a:defRPr>
+            </a:lvl1pPr>
+          </a:lstStyle>
+          <a:p>
+            <a:r>
+              <a:rPr lang="de-DE" sz="1200" dirty="0" err="1">
+                <a:solidFill>
+                  <a:schemeClr val="accent1">
+                    <a:lumMod val="50000"/>
+                  </a:schemeClr>
+                </a:solidFill>
+                <a:latin typeface="Consolas" panose="020B0609020204030204" pitchFamily="49" charset="0"/>
+              </a:rPr>
+              <a:t>Ipc</a:t>
+            </a:r>
+            <a:r>
+              <a:rPr lang="de-DE" sz="1200" dirty="0">
+                <a:solidFill>
+                  <a:schemeClr val="accent1">
+                    <a:lumMod val="50000"/>
+                  </a:schemeClr>
+                </a:solidFill>
+                <a:latin typeface="Consolas" panose="020B0609020204030204" pitchFamily="49" charset="0"/>
+              </a:rPr>
+              <a:t>::</a:t>
+            </a:r>
+            <a:r>
+              <a:rPr lang="de-DE" sz="1200" dirty="0" err="1">
+                <a:solidFill>
+                  <a:schemeClr val="accent1">
+                    <a:lumMod val="50000"/>
+                  </a:schemeClr>
+                </a:solidFill>
+                <a:latin typeface="Consolas" panose="020B0609020204030204" pitchFamily="49" charset="0"/>
+              </a:rPr>
+              <a:t>CServerGatewayThread</a:t>
+            </a:r>
+            <a:endParaRPr lang="de-DE" sz="1200" dirty="0">
+              <a:solidFill>
+                <a:schemeClr val="accent1">
+                  <a:lumMod val="50000"/>
+                </a:schemeClr>
+              </a:solidFill>
+            </a:endParaRPr>
+          </a:p>
+        </p:txBody>
+      </p:sp>
+      <p:sp>
+        <p:nvSpPr>
+          <p:cNvPr id="3" name="Pfeil: nach rechts 2">
+            <a:extLst>
+              <a:ext uri="{FF2B5EF4-FFF2-40B4-BE49-F238E27FC236}">
+                <a16:creationId xmlns:a16="http://schemas.microsoft.com/office/drawing/2014/main" id="{BDD2D3C6-F59C-42C7-ABBF-1B2651B9893B}"/>
               </a:ext>
             </a:extLst>
           </p:cNvPr>
@@ -5150,11 +5290,11 @@
           <p:nvPr/>
         </p:nvSpPr>
         <p:spPr>
-          <a:xfrm>
-            <a:off x="9307214" y="4109400"/>
-            <a:ext cx="179534" cy="345090"/>
-          </a:xfrm>
-          <a:prstGeom prst="downArrow">
+          <a:xfrm flipV="1">
+            <a:off x="9536912" y="3321450"/>
+            <a:ext cx="378912" cy="178348"/>
+          </a:xfrm>
+          <a:prstGeom prst="rightArrow">
             <a:avLst/>
           </a:prstGeom>
         </p:spPr>
@@ -5185,28 +5325,623 @@
       </p:sp>
       <p:cxnSp>
         <p:nvCxnSpPr>
-          <p:cNvPr id="67" name="Gerade Verbindung mit Pfeil 66">
-            <a:extLst>
-              <a:ext uri="{FF2B5EF4-FFF2-40B4-BE49-F238E27FC236}">
-                <a16:creationId xmlns:a16="http://schemas.microsoft.com/office/drawing/2014/main" id="{67B49FAA-40AC-429C-83FF-CCC9D8252EAD}"/>
+          <p:cNvPr id="37" name="Gerade Verbindung mit Pfeil 36">
+            <a:extLst>
+              <a:ext uri="{FF2B5EF4-FFF2-40B4-BE49-F238E27FC236}">
+                <a16:creationId xmlns:a16="http://schemas.microsoft.com/office/drawing/2014/main" id="{6AD3CCCD-5891-4137-A97E-688372597B4F}"/>
               </a:ext>
             </a:extLst>
           </p:cNvPr>
           <p:cNvCxnSpPr>
-            <a:stCxn id="7" idx="3"/>
-            <a:endCxn id="15" idx="1"/>
+            <a:cxnSpLocks/>
+            <a:stCxn id="7" idx="0"/>
+            <a:endCxn id="34" idx="2"/>
           </p:cNvCxnSpPr>
           <p:nvPr/>
         </p:nvCxnSpPr>
         <p:spPr>
-          <a:xfrm>
-            <a:off x="6378779" y="3533067"/>
-            <a:ext cx="2258467" cy="431565"/>
+          <a:xfrm flipH="1" flipV="1">
+            <a:off x="5163555" y="3034614"/>
+            <a:ext cx="517136" cy="353427"/>
           </a:xfrm>
           <a:prstGeom prst="straightConnector1">
             <a:avLst/>
           </a:prstGeom>
-          <a:ln w="31750" cmpd="dbl">
+          <a:ln>
+            <a:tailEnd type="arrow"/>
+          </a:ln>
+        </p:spPr>
+        <p:style>
+          <a:lnRef idx="1">
+            <a:schemeClr val="dk1"/>
+          </a:lnRef>
+          <a:fillRef idx="0">
+            <a:schemeClr val="dk1"/>
+          </a:fillRef>
+          <a:effectRef idx="0">
+            <a:schemeClr val="dk1"/>
+          </a:effectRef>
+          <a:fontRef idx="minor">
+            <a:schemeClr val="tx1"/>
+          </a:fontRef>
+        </p:style>
+      </p:cxnSp>
+      <p:sp>
+        <p:nvSpPr>
+          <p:cNvPr id="40" name="Titel 1">
+            <a:extLst>
+              <a:ext uri="{FF2B5EF4-FFF2-40B4-BE49-F238E27FC236}">
+                <a16:creationId xmlns:a16="http://schemas.microsoft.com/office/drawing/2014/main" id="{7911CBB2-79D8-4D68-894C-F8CCDB10FAF2}"/>
+              </a:ext>
+            </a:extLst>
+          </p:cNvPr>
+          <p:cNvSpPr txBox="1">
+            <a:spLocks/>
+          </p:cNvSpPr>
+          <p:nvPr/>
+        </p:nvSpPr>
+        <p:spPr>
+          <a:xfrm>
+            <a:off x="4465466" y="2198026"/>
+            <a:ext cx="1396177" cy="290052"/>
+          </a:xfrm>
+          <a:prstGeom prst="rect">
+            <a:avLst/>
+          </a:prstGeom>
+          <a:solidFill>
+            <a:schemeClr val="bg1">
+              <a:lumMod val="85000"/>
+            </a:schemeClr>
+          </a:solidFill>
+          <a:ln>
+            <a:solidFill>
+              <a:schemeClr val="tx1"/>
+            </a:solidFill>
+          </a:ln>
+        </p:spPr>
+        <p:txBody>
+          <a:bodyPr vert="horz" lIns="91440" tIns="45720" rIns="91440" bIns="45720" rtlCol="0" anchor="b">
+            <a:normAutofit/>
+          </a:bodyPr>
+          <a:lstStyle>
+            <a:lvl1pPr algn="ctr" defTabSz="914400" rtl="0" eaLnBrk="1" latinLnBrk="0" hangingPunct="1">
+              <a:lnSpc>
+                <a:spcPct val="90000"/>
+              </a:lnSpc>
+              <a:spcBef>
+                <a:spcPct val="0"/>
+              </a:spcBef>
+              <a:buNone/>
+              <a:defRPr sz="6000" kern="1200">
+                <a:solidFill>
+                  <a:schemeClr val="tx1"/>
+                </a:solidFill>
+                <a:latin typeface="+mj-lt"/>
+                <a:ea typeface="+mj-ea"/>
+                <a:cs typeface="+mj-cs"/>
+              </a:defRPr>
+            </a:lvl1pPr>
+          </a:lstStyle>
+          <a:p>
+            <a:r>
+              <a:rPr lang="de-DE" sz="1200" dirty="0" err="1">
+                <a:solidFill>
+                  <a:schemeClr val="accent1">
+                    <a:lumMod val="50000"/>
+                  </a:schemeClr>
+                </a:solidFill>
+                <a:latin typeface="Consolas" panose="020B0609020204030204" pitchFamily="49" charset="0"/>
+              </a:rPr>
+              <a:t>QTcpServer</a:t>
+            </a:r>
+            <a:endParaRPr lang="de-DE" sz="1200" dirty="0">
+              <a:solidFill>
+                <a:schemeClr val="accent1">
+                  <a:lumMod val="50000"/>
+                </a:schemeClr>
+              </a:solidFill>
+            </a:endParaRPr>
+          </a:p>
+        </p:txBody>
+      </p:sp>
+      <p:cxnSp>
+        <p:nvCxnSpPr>
+          <p:cNvPr id="41" name="Gerade Verbindung mit Pfeil 40">
+            <a:extLst>
+              <a:ext uri="{FF2B5EF4-FFF2-40B4-BE49-F238E27FC236}">
+                <a16:creationId xmlns:a16="http://schemas.microsoft.com/office/drawing/2014/main" id="{097806CA-7C7D-44A1-9379-0221DA0BFAF6}"/>
+              </a:ext>
+            </a:extLst>
+          </p:cNvPr>
+          <p:cNvCxnSpPr>
+            <a:cxnSpLocks/>
+            <a:stCxn id="34" idx="0"/>
+            <a:endCxn id="40" idx="2"/>
+          </p:cNvCxnSpPr>
+          <p:nvPr/>
+        </p:nvCxnSpPr>
+        <p:spPr>
+          <a:xfrm flipV="1">
+            <a:off x="5163555" y="2488078"/>
+            <a:ext cx="0" cy="256484"/>
+          </a:xfrm>
+          <a:prstGeom prst="straightConnector1">
+            <a:avLst/>
+          </a:prstGeom>
+          <a:ln>
+            <a:tailEnd type="arrow"/>
+          </a:ln>
+        </p:spPr>
+        <p:style>
+          <a:lnRef idx="1">
+            <a:schemeClr val="dk1"/>
+          </a:lnRef>
+          <a:fillRef idx="0">
+            <a:schemeClr val="dk1"/>
+          </a:fillRef>
+          <a:effectRef idx="0">
+            <a:schemeClr val="dk1"/>
+          </a:effectRef>
+          <a:fontRef idx="minor">
+            <a:schemeClr val="tx1"/>
+          </a:fontRef>
+        </p:style>
+      </p:cxnSp>
+      <p:sp>
+        <p:nvSpPr>
+          <p:cNvPr id="44" name="Titel 1">
+            <a:extLst>
+              <a:ext uri="{FF2B5EF4-FFF2-40B4-BE49-F238E27FC236}">
+                <a16:creationId xmlns:a16="http://schemas.microsoft.com/office/drawing/2014/main" id="{0FD0A0D9-03FA-41D8-932A-31DB5AC2A9DD}"/>
+              </a:ext>
+            </a:extLst>
+          </p:cNvPr>
+          <p:cNvSpPr txBox="1">
+            <a:spLocks/>
+          </p:cNvSpPr>
+          <p:nvPr/>
+        </p:nvSpPr>
+        <p:spPr>
+          <a:xfrm>
+            <a:off x="7610849" y="4371655"/>
+            <a:ext cx="2344303" cy="290052"/>
+          </a:xfrm>
+          <a:prstGeom prst="rect">
+            <a:avLst/>
+          </a:prstGeom>
+          <a:solidFill>
+            <a:schemeClr val="bg1">
+              <a:lumMod val="85000"/>
+            </a:schemeClr>
+          </a:solidFill>
+          <a:ln>
+            <a:solidFill>
+              <a:schemeClr val="tx1"/>
+            </a:solidFill>
+          </a:ln>
+        </p:spPr>
+        <p:txBody>
+          <a:bodyPr vert="horz" lIns="91440" tIns="45720" rIns="91440" bIns="45720" rtlCol="0" anchor="b">
+            <a:normAutofit/>
+          </a:bodyPr>
+          <a:lstStyle>
+            <a:lvl1pPr algn="ctr" defTabSz="914400" rtl="0" eaLnBrk="1" latinLnBrk="0" hangingPunct="1">
+              <a:lnSpc>
+                <a:spcPct val="90000"/>
+              </a:lnSpc>
+              <a:spcBef>
+                <a:spcPct val="0"/>
+              </a:spcBef>
+              <a:buNone/>
+              <a:defRPr sz="6000" kern="1200">
+                <a:solidFill>
+                  <a:schemeClr val="tx1"/>
+                </a:solidFill>
+                <a:latin typeface="+mj-lt"/>
+                <a:ea typeface="+mj-ea"/>
+                <a:cs typeface="+mj-cs"/>
+              </a:defRPr>
+            </a:lvl1pPr>
+          </a:lstStyle>
+          <a:p>
+            <a:r>
+              <a:rPr lang="de-DE" sz="1200" dirty="0" err="1">
+                <a:solidFill>
+                  <a:schemeClr val="accent1">
+                    <a:lumMod val="50000"/>
+                  </a:schemeClr>
+                </a:solidFill>
+                <a:latin typeface="Consolas" panose="020B0609020204030204" pitchFamily="49" charset="0"/>
+              </a:rPr>
+              <a:t>Ipc</a:t>
+            </a:r>
+            <a:r>
+              <a:rPr lang="de-DE" sz="1200" dirty="0">
+                <a:solidFill>
+                  <a:schemeClr val="accent1">
+                    <a:lumMod val="50000"/>
+                  </a:schemeClr>
+                </a:solidFill>
+                <a:latin typeface="Consolas" panose="020B0609020204030204" pitchFamily="49" charset="0"/>
+              </a:rPr>
+              <a:t>::</a:t>
+            </a:r>
+            <a:r>
+              <a:rPr lang="de-DE" sz="1200" dirty="0" err="1">
+                <a:solidFill>
+                  <a:schemeClr val="accent1">
+                    <a:lumMod val="50000"/>
+                  </a:schemeClr>
+                </a:solidFill>
+                <a:latin typeface="Consolas" panose="020B0609020204030204" pitchFamily="49" charset="0"/>
+              </a:rPr>
+              <a:t>CClientGatewayThread</a:t>
+            </a:r>
+            <a:endParaRPr lang="de-DE" sz="1200" dirty="0">
+              <a:solidFill>
+                <a:schemeClr val="accent1">
+                  <a:lumMod val="50000"/>
+                </a:schemeClr>
+              </a:solidFill>
+            </a:endParaRPr>
+          </a:p>
+        </p:txBody>
+      </p:sp>
+      <p:sp>
+        <p:nvSpPr>
+          <p:cNvPr id="45" name="Titel 1">
+            <a:extLst>
+              <a:ext uri="{FF2B5EF4-FFF2-40B4-BE49-F238E27FC236}">
+                <a16:creationId xmlns:a16="http://schemas.microsoft.com/office/drawing/2014/main" id="{C2DB3F4D-F6EC-4197-9BB5-BF0DCF6B640C}"/>
+              </a:ext>
+            </a:extLst>
+          </p:cNvPr>
+          <p:cNvSpPr txBox="1">
+            <a:spLocks/>
+          </p:cNvSpPr>
+          <p:nvPr/>
+        </p:nvSpPr>
+        <p:spPr>
+          <a:xfrm>
+            <a:off x="8088652" y="4877711"/>
+            <a:ext cx="1396177" cy="290052"/>
+          </a:xfrm>
+          <a:prstGeom prst="rect">
+            <a:avLst/>
+          </a:prstGeom>
+          <a:solidFill>
+            <a:schemeClr val="bg1">
+              <a:lumMod val="85000"/>
+            </a:schemeClr>
+          </a:solidFill>
+          <a:ln>
+            <a:solidFill>
+              <a:schemeClr val="tx1"/>
+            </a:solidFill>
+          </a:ln>
+        </p:spPr>
+        <p:txBody>
+          <a:bodyPr vert="horz" lIns="91440" tIns="45720" rIns="91440" bIns="45720" rtlCol="0" anchor="b">
+            <a:normAutofit/>
+          </a:bodyPr>
+          <a:lstStyle>
+            <a:lvl1pPr algn="ctr" defTabSz="914400" rtl="0" eaLnBrk="1" latinLnBrk="0" hangingPunct="1">
+              <a:lnSpc>
+                <a:spcPct val="90000"/>
+              </a:lnSpc>
+              <a:spcBef>
+                <a:spcPct val="0"/>
+              </a:spcBef>
+              <a:buNone/>
+              <a:defRPr sz="6000" kern="1200">
+                <a:solidFill>
+                  <a:schemeClr val="tx1"/>
+                </a:solidFill>
+                <a:latin typeface="+mj-lt"/>
+                <a:ea typeface="+mj-ea"/>
+                <a:cs typeface="+mj-cs"/>
+              </a:defRPr>
+            </a:lvl1pPr>
+          </a:lstStyle>
+          <a:p>
+            <a:r>
+              <a:rPr lang="de-DE" sz="1200" dirty="0" err="1">
+                <a:solidFill>
+                  <a:schemeClr val="accent1">
+                    <a:lumMod val="50000"/>
+                  </a:schemeClr>
+                </a:solidFill>
+                <a:latin typeface="Consolas" panose="020B0609020204030204" pitchFamily="49" charset="0"/>
+              </a:rPr>
+              <a:t>QTcpSocket</a:t>
+            </a:r>
+            <a:endParaRPr lang="de-DE" sz="1200" dirty="0">
+              <a:solidFill>
+                <a:schemeClr val="accent1">
+                  <a:lumMod val="50000"/>
+                </a:schemeClr>
+              </a:solidFill>
+            </a:endParaRPr>
+          </a:p>
+        </p:txBody>
+      </p:sp>
+      <p:sp>
+        <p:nvSpPr>
+          <p:cNvPr id="47" name="Titel 1">
+            <a:extLst>
+              <a:ext uri="{FF2B5EF4-FFF2-40B4-BE49-F238E27FC236}">
+                <a16:creationId xmlns:a16="http://schemas.microsoft.com/office/drawing/2014/main" id="{2F94DF2C-4F30-4AAF-A192-D9C9BF60A8B2}"/>
+              </a:ext>
+            </a:extLst>
+          </p:cNvPr>
+          <p:cNvSpPr txBox="1">
+            <a:spLocks/>
+          </p:cNvSpPr>
+          <p:nvPr/>
+        </p:nvSpPr>
+        <p:spPr>
+          <a:xfrm>
+            <a:off x="4465466" y="1421632"/>
+            <a:ext cx="1396177" cy="290052"/>
+          </a:xfrm>
+          <a:prstGeom prst="rect">
+            <a:avLst/>
+          </a:prstGeom>
+          <a:solidFill>
+            <a:schemeClr val="bg1">
+              <a:lumMod val="85000"/>
+            </a:schemeClr>
+          </a:solidFill>
+          <a:ln>
+            <a:solidFill>
+              <a:schemeClr val="tx1"/>
+            </a:solidFill>
+          </a:ln>
+        </p:spPr>
+        <p:txBody>
+          <a:bodyPr vert="horz" lIns="91440" tIns="45720" rIns="91440" bIns="45720" rtlCol="0" anchor="b">
+            <a:normAutofit/>
+          </a:bodyPr>
+          <a:lstStyle>
+            <a:lvl1pPr algn="ctr" defTabSz="914400" rtl="0" eaLnBrk="1" latinLnBrk="0" hangingPunct="1">
+              <a:lnSpc>
+                <a:spcPct val="90000"/>
+              </a:lnSpc>
+              <a:spcBef>
+                <a:spcPct val="0"/>
+              </a:spcBef>
+              <a:buNone/>
+              <a:defRPr sz="6000" kern="1200">
+                <a:solidFill>
+                  <a:schemeClr val="tx1"/>
+                </a:solidFill>
+                <a:latin typeface="+mj-lt"/>
+                <a:ea typeface="+mj-ea"/>
+                <a:cs typeface="+mj-cs"/>
+              </a:defRPr>
+            </a:lvl1pPr>
+          </a:lstStyle>
+          <a:p>
+            <a:r>
+              <a:rPr lang="de-DE" sz="1200" dirty="0" err="1">
+                <a:solidFill>
+                  <a:schemeClr val="accent1">
+                    <a:lumMod val="50000"/>
+                  </a:schemeClr>
+                </a:solidFill>
+                <a:latin typeface="Consolas" panose="020B0609020204030204" pitchFamily="49" charset="0"/>
+              </a:rPr>
+              <a:t>QTcpSocket</a:t>
+            </a:r>
+            <a:endParaRPr lang="de-DE" sz="1200" dirty="0">
+              <a:solidFill>
+                <a:schemeClr val="accent1">
+                  <a:lumMod val="50000"/>
+                </a:schemeClr>
+              </a:solidFill>
+            </a:endParaRPr>
+          </a:p>
+        </p:txBody>
+      </p:sp>
+      <p:cxnSp>
+        <p:nvCxnSpPr>
+          <p:cNvPr id="48" name="Gerade Verbindung mit Pfeil 47">
+            <a:extLst>
+              <a:ext uri="{FF2B5EF4-FFF2-40B4-BE49-F238E27FC236}">
+                <a16:creationId xmlns:a16="http://schemas.microsoft.com/office/drawing/2014/main" id="{4E0FBCCA-5EDE-48D5-AA96-97473DB76D3B}"/>
+              </a:ext>
+            </a:extLst>
+          </p:cNvPr>
+          <p:cNvCxnSpPr>
+            <a:cxnSpLocks/>
+            <a:stCxn id="40" idx="0"/>
+            <a:endCxn id="47" idx="2"/>
+          </p:cNvCxnSpPr>
+          <p:nvPr/>
+        </p:nvCxnSpPr>
+        <p:spPr>
+          <a:xfrm flipV="1">
+            <a:off x="5163555" y="1711684"/>
+            <a:ext cx="0" cy="486342"/>
+          </a:xfrm>
+          <a:prstGeom prst="straightConnector1">
+            <a:avLst/>
+          </a:prstGeom>
+          <a:ln>
+            <a:tailEnd type="arrow"/>
+          </a:ln>
+        </p:spPr>
+        <p:style>
+          <a:lnRef idx="1">
+            <a:schemeClr val="dk1"/>
+          </a:lnRef>
+          <a:fillRef idx="0">
+            <a:schemeClr val="dk1"/>
+          </a:fillRef>
+          <a:effectRef idx="0">
+            <a:schemeClr val="dk1"/>
+          </a:effectRef>
+          <a:fontRef idx="minor">
+            <a:schemeClr val="tx1"/>
+          </a:fontRef>
+        </p:style>
+      </p:cxnSp>
+      <p:sp>
+        <p:nvSpPr>
+          <p:cNvPr id="50" name="Textfeld 49">
+            <a:extLst>
+              <a:ext uri="{FF2B5EF4-FFF2-40B4-BE49-F238E27FC236}">
+                <a16:creationId xmlns:a16="http://schemas.microsoft.com/office/drawing/2014/main" id="{CB133449-9485-4021-97DC-8C90FB9C6D7B}"/>
+              </a:ext>
+            </a:extLst>
+          </p:cNvPr>
+          <p:cNvSpPr txBox="1"/>
+          <p:nvPr/>
+        </p:nvSpPr>
+        <p:spPr>
+          <a:xfrm>
+            <a:off x="4095541" y="1773285"/>
+            <a:ext cx="1154482" cy="400110"/>
+          </a:xfrm>
+          <a:prstGeom prst="rect">
+            <a:avLst/>
+          </a:prstGeom>
+          <a:noFill/>
+        </p:spPr>
+        <p:txBody>
+          <a:bodyPr wrap="none" rtlCol="0">
+            <a:spAutoFit/>
+          </a:bodyPr>
+          <a:lstStyle/>
+          <a:p>
+            <a:pPr algn="ctr"/>
+            <a:r>
+              <a:rPr lang="de-DE" sz="1000" dirty="0" err="1"/>
+              <a:t>creates</a:t>
+            </a:r>
+            <a:endParaRPr lang="de-DE" sz="1000" dirty="0"/>
+          </a:p>
+          <a:p>
+            <a:pPr algn="ctr"/>
+            <a:r>
+              <a:rPr lang="de-DE" sz="1000" dirty="0" err="1"/>
+              <a:t>onNewConnection</a:t>
+            </a:r>
+            <a:endParaRPr lang="de-DE" sz="1000" dirty="0"/>
+          </a:p>
+        </p:txBody>
+      </p:sp>
+      <p:cxnSp>
+        <p:nvCxnSpPr>
+          <p:cNvPr id="51" name="Gerade Verbindung mit Pfeil 50">
+            <a:extLst>
+              <a:ext uri="{FF2B5EF4-FFF2-40B4-BE49-F238E27FC236}">
+                <a16:creationId xmlns:a16="http://schemas.microsoft.com/office/drawing/2014/main" id="{09787DFB-DBFF-4C08-B16A-FD926FE623D4}"/>
+              </a:ext>
+            </a:extLst>
+          </p:cNvPr>
+          <p:cNvCxnSpPr>
+            <a:cxnSpLocks/>
+            <a:stCxn id="15" idx="2"/>
+            <a:endCxn id="44" idx="0"/>
+          </p:cNvCxnSpPr>
+          <p:nvPr/>
+        </p:nvCxnSpPr>
+        <p:spPr>
+          <a:xfrm>
+            <a:off x="8782281" y="4109658"/>
+            <a:ext cx="720" cy="261997"/>
+          </a:xfrm>
+          <a:prstGeom prst="straightConnector1">
+            <a:avLst/>
+          </a:prstGeom>
+          <a:ln>
+            <a:tailEnd type="arrow"/>
+          </a:ln>
+        </p:spPr>
+        <p:style>
+          <a:lnRef idx="1">
+            <a:schemeClr val="dk1"/>
+          </a:lnRef>
+          <a:fillRef idx="0">
+            <a:schemeClr val="dk1"/>
+          </a:fillRef>
+          <a:effectRef idx="0">
+            <a:schemeClr val="dk1"/>
+          </a:effectRef>
+          <a:fontRef idx="minor">
+            <a:schemeClr val="tx1"/>
+          </a:fontRef>
+        </p:style>
+      </p:cxnSp>
+      <p:cxnSp>
+        <p:nvCxnSpPr>
+          <p:cNvPr id="55" name="Gerade Verbindung mit Pfeil 54">
+            <a:extLst>
+              <a:ext uri="{FF2B5EF4-FFF2-40B4-BE49-F238E27FC236}">
+                <a16:creationId xmlns:a16="http://schemas.microsoft.com/office/drawing/2014/main" id="{4D5E3B54-38AA-4538-A34F-7647FE8792C6}"/>
+              </a:ext>
+            </a:extLst>
+          </p:cNvPr>
+          <p:cNvCxnSpPr>
+            <a:cxnSpLocks/>
+            <a:stCxn id="44" idx="2"/>
+            <a:endCxn id="45" idx="0"/>
+          </p:cNvCxnSpPr>
+          <p:nvPr/>
+        </p:nvCxnSpPr>
+        <p:spPr>
+          <a:xfrm>
+            <a:off x="8783001" y="4661707"/>
+            <a:ext cx="3740" cy="216004"/>
+          </a:xfrm>
+          <a:prstGeom prst="straightConnector1">
+            <a:avLst/>
+          </a:prstGeom>
+          <a:ln>
+            <a:tailEnd type="arrow"/>
+          </a:ln>
+        </p:spPr>
+        <p:style>
+          <a:lnRef idx="1">
+            <a:schemeClr val="dk1"/>
+          </a:lnRef>
+          <a:fillRef idx="0">
+            <a:schemeClr val="dk1"/>
+          </a:fillRef>
+          <a:effectRef idx="0">
+            <a:schemeClr val="dk1"/>
+          </a:effectRef>
+          <a:fontRef idx="minor">
+            <a:schemeClr val="tx1"/>
+          </a:fontRef>
+        </p:style>
+      </p:cxnSp>
+      <p:cxnSp>
+        <p:nvCxnSpPr>
+          <p:cNvPr id="59" name="Verbinder: gewinkelt 58">
+            <a:extLst>
+              <a:ext uri="{FF2B5EF4-FFF2-40B4-BE49-F238E27FC236}">
+                <a16:creationId xmlns:a16="http://schemas.microsoft.com/office/drawing/2014/main" id="{5B84F043-F95B-4CD9-B034-0B3D96A05FBC}"/>
+              </a:ext>
+            </a:extLst>
+          </p:cNvPr>
+          <p:cNvCxnSpPr>
+            <a:cxnSpLocks/>
+            <a:stCxn id="47" idx="3"/>
+            <a:endCxn id="45" idx="1"/>
+          </p:cNvCxnSpPr>
+          <p:nvPr/>
+        </p:nvCxnSpPr>
+        <p:spPr>
+          <a:xfrm>
+            <a:off x="5861643" y="1566658"/>
+            <a:ext cx="2227009" cy="3456079"/>
+          </a:xfrm>
+          <a:prstGeom prst="bentConnector3">
+            <a:avLst/>
+          </a:prstGeom>
+          <a:ln w="53975" cmpd="dbl">
             <a:headEnd type="triangle"/>
             <a:tailEnd type="triangle"/>
           </a:ln>
@@ -5228,10 +5963,10 @@
       </p:cxnSp>
       <p:sp>
         <p:nvSpPr>
-          <p:cNvPr id="68" name="Textfeld 67">
-            <a:extLst>
-              <a:ext uri="{FF2B5EF4-FFF2-40B4-BE49-F238E27FC236}">
-                <a16:creationId xmlns:a16="http://schemas.microsoft.com/office/drawing/2014/main" id="{DC3D8D6D-472A-428B-A3BE-B793130FF065}"/>
+          <p:cNvPr id="52" name="Textfeld 51">
+            <a:extLst>
+              <a:ext uri="{FF2B5EF4-FFF2-40B4-BE49-F238E27FC236}">
+                <a16:creationId xmlns:a16="http://schemas.microsoft.com/office/drawing/2014/main" id="{B421FCA2-AA0E-4993-B71E-712B4E9B2199}"/>
               </a:ext>
             </a:extLst>
           </p:cNvPr>
@@ -5240,8 +5975,8 @@
         </p:nvSpPr>
         <p:spPr>
           <a:xfrm>
-            <a:off x="6550242" y="3575480"/>
-            <a:ext cx="1532471" cy="307777"/>
+            <a:off x="1569235" y="1760068"/>
+            <a:ext cx="2335896" cy="553998"/>
           </a:xfrm>
           <a:prstGeom prst="rect">
             <a:avLst/>
@@ -5254,13 +5989,167 @@
           </a:bodyPr>
           <a:lstStyle/>
           <a:p>
-            <a:r>
-              <a:rPr lang="de-DE" sz="1400" dirty="0"/>
-              <a:t>TCP/IP Connection</a:t>
-            </a:r>
-          </a:p>
-        </p:txBody>
-      </p:sp>
+            <a:pPr marL="171450" indent="-171450">
+              <a:buFont typeface="Arial" panose="020B0604020202020204" pitchFamily="34" charset="0"/>
+              <a:buChar char="•"/>
+            </a:pPr>
+            <a:r>
+              <a:rPr lang="de-DE" sz="1000" dirty="0" err="1"/>
+              <a:t>receives</a:t>
+            </a:r>
+            <a:r>
+              <a:rPr lang="de-DE" sz="1000" dirty="0"/>
+              <a:t> </a:t>
+            </a:r>
+            <a:r>
+              <a:rPr lang="de-DE" sz="1000" dirty="0" err="1"/>
+              <a:t>data</a:t>
+            </a:r>
+            <a:r>
+              <a:rPr lang="de-DE" sz="1000" dirty="0"/>
+              <a:t> </a:t>
+            </a:r>
+            <a:r>
+              <a:rPr lang="de-DE" sz="1000" dirty="0" err="1"/>
+              <a:t>blocks</a:t>
+            </a:r>
+            <a:endParaRPr lang="de-DE" sz="1000" dirty="0"/>
+          </a:p>
+          <a:p>
+            <a:pPr marL="171450" indent="-171450">
+              <a:buFont typeface="Arial" panose="020B0604020202020204" pitchFamily="34" charset="0"/>
+              <a:buChar char="•"/>
+            </a:pPr>
+            <a:r>
+              <a:rPr lang="de-DE" sz="1000" dirty="0" err="1"/>
+              <a:t>wrappes</a:t>
+            </a:r>
+            <a:r>
+              <a:rPr lang="de-DE" sz="1000" dirty="0"/>
+              <a:t> </a:t>
+            </a:r>
+            <a:r>
+              <a:rPr lang="de-DE" sz="1000" dirty="0" err="1"/>
+              <a:t>them</a:t>
+            </a:r>
+            <a:r>
+              <a:rPr lang="de-DE" sz="1000" dirty="0"/>
+              <a:t> </a:t>
+            </a:r>
+            <a:r>
+              <a:rPr lang="de-DE" sz="1000" dirty="0" err="1"/>
+              <a:t>into</a:t>
+            </a:r>
+            <a:r>
+              <a:rPr lang="de-DE" sz="1000" dirty="0"/>
+              <a:t> a </a:t>
+            </a:r>
+            <a:r>
+              <a:rPr lang="de-DE" sz="1000" dirty="0" err="1"/>
+              <a:t>message</a:t>
+            </a:r>
+            <a:endParaRPr lang="de-DE" sz="1000" dirty="0"/>
+          </a:p>
+          <a:p>
+            <a:pPr marL="171450" indent="-171450">
+              <a:buFont typeface="Arial" panose="020B0604020202020204" pitchFamily="34" charset="0"/>
+              <a:buChar char="•"/>
+            </a:pPr>
+            <a:r>
+              <a:rPr lang="de-DE" sz="1000" dirty="0" err="1"/>
+              <a:t>sends</a:t>
+            </a:r>
+            <a:r>
+              <a:rPr lang="de-DE" sz="1000" dirty="0"/>
+              <a:t> </a:t>
+            </a:r>
+            <a:r>
+              <a:rPr lang="de-DE" sz="1000" dirty="0" err="1"/>
+              <a:t>the</a:t>
+            </a:r>
+            <a:r>
+              <a:rPr lang="de-DE" sz="1000" dirty="0"/>
+              <a:t> </a:t>
+            </a:r>
+            <a:r>
+              <a:rPr lang="de-DE" sz="1000" dirty="0" err="1"/>
+              <a:t>data</a:t>
+            </a:r>
+            <a:r>
+              <a:rPr lang="de-DE" sz="1000" dirty="0"/>
+              <a:t> </a:t>
+            </a:r>
+            <a:r>
+              <a:rPr lang="de-DE" sz="1000" dirty="0" err="1"/>
+              <a:t>message</a:t>
+            </a:r>
+            <a:r>
+              <a:rPr lang="de-DE" sz="1000" dirty="0"/>
+              <a:t> </a:t>
+            </a:r>
+            <a:r>
+              <a:rPr lang="de-DE" sz="1000" dirty="0" err="1"/>
+              <a:t>to</a:t>
+            </a:r>
+            <a:r>
+              <a:rPr lang="de-DE" sz="1000" dirty="0"/>
+              <a:t> </a:t>
+            </a:r>
+            <a:r>
+              <a:rPr lang="de-DE" sz="1000" dirty="0" err="1"/>
+              <a:t>Ipc</a:t>
+            </a:r>
+            <a:r>
+              <a:rPr lang="de-DE" sz="1000" dirty="0"/>
+              <a:t>::Server</a:t>
+            </a:r>
+          </a:p>
+        </p:txBody>
+      </p:sp>
+      <p:cxnSp>
+        <p:nvCxnSpPr>
+          <p:cNvPr id="54" name="Gerade Verbindung mit Pfeil 53">
+            <a:extLst>
+              <a:ext uri="{FF2B5EF4-FFF2-40B4-BE49-F238E27FC236}">
+                <a16:creationId xmlns:a16="http://schemas.microsoft.com/office/drawing/2014/main" id="{DEE403E7-5A09-4E03-861A-653F17BB201F}"/>
+              </a:ext>
+            </a:extLst>
+          </p:cNvPr>
+          <p:cNvCxnSpPr>
+            <a:cxnSpLocks/>
+            <a:stCxn id="52" idx="2"/>
+            <a:endCxn id="34" idx="0"/>
+          </p:cNvCxnSpPr>
+          <p:nvPr/>
+        </p:nvCxnSpPr>
+        <p:spPr>
+          <a:xfrm>
+            <a:off x="2737183" y="2314066"/>
+            <a:ext cx="2426372" cy="430496"/>
+          </a:xfrm>
+          <a:prstGeom prst="straightConnector1">
+            <a:avLst/>
+          </a:prstGeom>
+          <a:ln>
+            <a:prstDash val="sysDash"/>
+            <a:tailEnd type="arrow"/>
+          </a:ln>
+        </p:spPr>
+        <p:style>
+          <a:lnRef idx="1">
+            <a:schemeClr val="dk1"/>
+          </a:lnRef>
+          <a:fillRef idx="0">
+            <a:schemeClr val="dk1"/>
+          </a:fillRef>
+          <a:effectRef idx="0">
+            <a:schemeClr val="dk1"/>
+          </a:effectRef>
+          <a:fontRef idx="minor">
+            <a:schemeClr val="tx1"/>
+          </a:fontRef>
+        </p:style>
+      </p:cxnSp>
     </p:spTree>
     <p:extLst>
       <p:ext uri="{BB962C8B-B14F-4D97-AF65-F5344CB8AC3E}">

</xml_diff>